<commit_message>
Issue 159: Add poster for autoanimate Udate Issue 159
</commit_message>
<xml_diff>
--- a/doc/Poster-spotlight.pptx
+++ b/doc/Poster-spotlight.pptx
@@ -294,7 +294,7 @@
             <a:fld id="{1D8BD707-D9CF-40AE-B4C6-C98DA3205C09}" type="datetimeFigureOut">
               <a:rPr lang="en-US" smtClean="0"/>
               <a:pPr/>
-              <a:t>1/13/2014</a:t>
+              <a:t>1/17/2014</a:t>
             </a:fld>
             <a:endParaRPr lang="en-US"/>
           </a:p>
@@ -461,7 +461,7 @@
             <a:fld id="{1D8BD707-D9CF-40AE-B4C6-C98DA3205C09}" type="datetimeFigureOut">
               <a:rPr lang="en-US" smtClean="0"/>
               <a:pPr/>
-              <a:t>1/13/2014</a:t>
+              <a:t>1/17/2014</a:t>
             </a:fld>
             <a:endParaRPr lang="en-US"/>
           </a:p>
@@ -638,7 +638,7 @@
             <a:fld id="{1D8BD707-D9CF-40AE-B4C6-C98DA3205C09}" type="datetimeFigureOut">
               <a:rPr lang="en-US" smtClean="0"/>
               <a:pPr/>
-              <a:t>1/13/2014</a:t>
+              <a:t>1/17/2014</a:t>
             </a:fld>
             <a:endParaRPr lang="en-US"/>
           </a:p>
@@ -805,7 +805,7 @@
             <a:fld id="{1D8BD707-D9CF-40AE-B4C6-C98DA3205C09}" type="datetimeFigureOut">
               <a:rPr lang="en-US" smtClean="0"/>
               <a:pPr/>
-              <a:t>1/13/2014</a:t>
+              <a:t>1/17/2014</a:t>
             </a:fld>
             <a:endParaRPr lang="en-US"/>
           </a:p>
@@ -1048,7 +1048,7 @@
             <a:fld id="{1D8BD707-D9CF-40AE-B4C6-C98DA3205C09}" type="datetimeFigureOut">
               <a:rPr lang="en-US" smtClean="0"/>
               <a:pPr/>
-              <a:t>1/13/2014</a:t>
+              <a:t>1/17/2014</a:t>
             </a:fld>
             <a:endParaRPr lang="en-US"/>
           </a:p>
@@ -1333,7 +1333,7 @@
             <a:fld id="{1D8BD707-D9CF-40AE-B4C6-C98DA3205C09}" type="datetimeFigureOut">
               <a:rPr lang="en-US" smtClean="0"/>
               <a:pPr/>
-              <a:t>1/13/2014</a:t>
+              <a:t>1/17/2014</a:t>
             </a:fld>
             <a:endParaRPr lang="en-US"/>
           </a:p>
@@ -1752,7 +1752,7 @@
             <a:fld id="{1D8BD707-D9CF-40AE-B4C6-C98DA3205C09}" type="datetimeFigureOut">
               <a:rPr lang="en-US" smtClean="0"/>
               <a:pPr/>
-              <a:t>1/13/2014</a:t>
+              <a:t>1/17/2014</a:t>
             </a:fld>
             <a:endParaRPr lang="en-US"/>
           </a:p>
@@ -1867,7 +1867,7 @@
             <a:fld id="{1D8BD707-D9CF-40AE-B4C6-C98DA3205C09}" type="datetimeFigureOut">
               <a:rPr lang="en-US" smtClean="0"/>
               <a:pPr/>
-              <a:t>1/13/2014</a:t>
+              <a:t>1/17/2014</a:t>
             </a:fld>
             <a:endParaRPr lang="en-US"/>
           </a:p>
@@ -1959,7 +1959,7 @@
             <a:fld id="{1D8BD707-D9CF-40AE-B4C6-C98DA3205C09}" type="datetimeFigureOut">
               <a:rPr lang="en-US" smtClean="0"/>
               <a:pPr/>
-              <a:t>1/13/2014</a:t>
+              <a:t>1/17/2014</a:t>
             </a:fld>
             <a:endParaRPr lang="en-US"/>
           </a:p>
@@ -2233,7 +2233,7 @@
             <a:fld id="{1D8BD707-D9CF-40AE-B4C6-C98DA3205C09}" type="datetimeFigureOut">
               <a:rPr lang="en-US" smtClean="0"/>
               <a:pPr/>
-              <a:t>1/13/2014</a:t>
+              <a:t>1/17/2014</a:t>
             </a:fld>
             <a:endParaRPr lang="en-US"/>
           </a:p>
@@ -2483,7 +2483,7 @@
             <a:fld id="{1D8BD707-D9CF-40AE-B4C6-C98DA3205C09}" type="datetimeFigureOut">
               <a:rPr lang="en-US" smtClean="0"/>
               <a:pPr/>
-              <a:t>1/13/2014</a:t>
+              <a:t>1/17/2014</a:t>
             </a:fld>
             <a:endParaRPr lang="en-US"/>
           </a:p>
@@ -2693,7 +2693,7 @@
             <a:fld id="{1D8BD707-D9CF-40AE-B4C6-C98DA3205C09}" type="datetimeFigureOut">
               <a:rPr lang="en-US" smtClean="0"/>
               <a:pPr/>
-              <a:t>1/13/2014</a:t>
+              <a:t>1/17/2014</a:t>
             </a:fld>
             <a:endParaRPr lang="en-US"/>
           </a:p>
@@ -3186,11 +3186,15 @@
             </a:r>
             <a:r>
               <a:rPr lang="en-US" dirty="0" err="1" smtClean="0"/>
-              <a:t>PowePointLabs</a:t>
+              <a:t>PowerPointLabs</a:t>
             </a:r>
             <a:r>
               <a:rPr lang="en-US" dirty="0" smtClean="0"/>
-              <a:t> plugin from </a:t>
+              <a:t> </a:t>
+            </a:r>
+            <a:r>
+              <a:rPr lang="en-US" dirty="0" smtClean="0"/>
+              <a:t>plugin from </a:t>
             </a:r>
             <a:r>
               <a:rPr lang="en-US" dirty="0" smtClean="0">
@@ -3265,15 +3269,6 @@
                 <a:tailEnd/>
               </a14:hiddenLine>
             </a:ext>
-            <a:ext uri="{AF507438-7753-43E0-B8FC-AC1667EBCBE1}">
-              <a14:hiddenEffects xmlns:a14="http://schemas.microsoft.com/office/drawing/2010/main">
-                <a:effectLst>
-                  <a:outerShdw dist="35921" dir="2700000" algn="ctr" rotWithShape="0">
-                    <a:schemeClr val="bg2"/>
-                  </a:outerShdw>
-                </a:effectLst>
-              </a14:hiddenEffects>
-            </a:ext>
           </a:extLst>
         </p:spPr>
       </p:pic>
@@ -3381,15 +3376,6 @@
                 <a:headEnd/>
                 <a:tailEnd/>
               </a14:hiddenLine>
-            </a:ext>
-            <a:ext uri="{AF507438-7753-43E0-B8FC-AC1667EBCBE1}">
-              <a14:hiddenEffects xmlns:a14="http://schemas.microsoft.com/office/drawing/2010/main">
-                <a:effectLst>
-                  <a:outerShdw dist="35921" dir="2700000" algn="ctr" rotWithShape="0">
-                    <a:schemeClr val="bg2"/>
-                  </a:outerShdw>
-                </a:effectLst>
-              </a14:hiddenEffects>
             </a:ext>
           </a:extLst>
         </p:spPr>
@@ -3509,15 +3495,6 @@
                 <a:tailEnd/>
               </a14:hiddenLine>
             </a:ext>
-            <a:ext uri="{AF507438-7753-43E0-B8FC-AC1667EBCBE1}">
-              <a14:hiddenEffects xmlns:a14="http://schemas.microsoft.com/office/drawing/2010/main">
-                <a:effectLst>
-                  <a:outerShdw dist="35921" dir="2700000" algn="ctr" rotWithShape="0">
-                    <a:schemeClr val="bg2"/>
-                  </a:outerShdw>
-                </a:effectLst>
-              </a14:hiddenEffects>
-            </a:ext>
           </a:extLst>
         </p:spPr>
       </p:pic>
@@ -3657,6 +3634,13 @@
   <p:clrMapOvr>
     <a:masterClrMapping/>
   </p:clrMapOvr>
+  <p:timing>
+    <p:tnLst>
+      <p:par>
+        <p:cTn id="1" dur="indefinite" restart="never" nodeType="tmRoot"/>
+      </p:par>
+    </p:tnLst>
+  </p:timing>
 </p:sld>
 </file>
 
@@ -3776,6 +3760,13 @@
   <p:clrMapOvr>
     <a:masterClrMapping/>
   </p:clrMapOvr>
+  <p:timing>
+    <p:tnLst>
+      <p:par>
+        <p:cTn id="1" dur="indefinite" restart="never" nodeType="tmRoot"/>
+      </p:par>
+    </p:tnLst>
+  </p:timing>
 </p:sld>
 </file>
 
@@ -3987,6 +3978,13 @@
   <p:clrMapOvr>
     <a:masterClrMapping/>
   </p:clrMapOvr>
+  <p:timing>
+    <p:tnLst>
+      <p:par>
+        <p:cTn id="1" dur="indefinite" restart="never" nodeType="tmRoot"/>
+      </p:par>
+    </p:tnLst>
+  </p:timing>
 </p:sld>
 </file>
 
@@ -4475,11 +4473,11 @@
   <p:clrMapOvr>
     <a:masterClrMapping/>
   </p:clrMapOvr>
-  <mc:AlternateContent xmlns:mc="http://schemas.openxmlformats.org/markup-compatibility/2006">
-    <mc:Choice xmlns:p14="http://schemas.microsoft.com/office/powerpoint/2010/main" Requires="p14">
+  <mc:AlternateContent xmlns:mc="http://schemas.openxmlformats.org/markup-compatibility/2006" xmlns:p14="http://schemas.microsoft.com/office/powerpoint/2010/main">
+    <mc:Choice Requires="p14">
       <p:transition spd="slow" p14:dur="2000"/>
     </mc:Choice>
-    <mc:Fallback>
+    <mc:Fallback xmlns="">
       <p:transition spd="slow"/>
     </mc:Fallback>
   </mc:AlternateContent>

</xml_diff>